<commit_message>
Added some visual enhancements and another state for the Avatar
</commit_message>
<xml_diff>
--- a/working-files/Visual Assets.pptx
+++ b/working-files/Visual Assets.pptx
@@ -9,6 +9,9 @@
   </p:sldIdLst>
   <p:sldSz cx="12192000" cy="6858000"/>
   <p:notesSz cx="6858000" cy="9144000"/>
+  <p:custDataLst>
+    <p:tags r:id="rId3"/>
+  </p:custDataLst>
   <p:defaultTextStyle>
     <a:defPPr>
       <a:defRPr lang="en-US"/>
@@ -104,6 +107,11 @@
       </a:defRPr>
     </a:lvl9pPr>
   </p:defaultTextStyle>
+  <p:extLst>
+    <p:ext uri="{EFAFB233-063F-42B5-8137-9DF3F51BA10A}">
+      <p15:sldGuideLst xmlns:p15="http://schemas.microsoft.com/office/powerpoint/2012/main"/>
+    </p:ext>
+  </p:extLst>
 </p:presentation>
 </file>
 
@@ -4268,7 +4276,76 @@
           </a:p>
         </p:txBody>
       </p:sp>
+      <p:sp>
+        <p:nvSpPr>
+          <p:cNvPr id="2" name="Rectangle: Rounded Corners 1">
+            <a:extLst>
+              <a:ext uri="{FF2B5EF4-FFF2-40B4-BE49-F238E27FC236}">
+                <a16:creationId xmlns:a16="http://schemas.microsoft.com/office/drawing/2014/main" id="{11A4233D-6E5B-2160-DEF9-05839975E848}"/>
+              </a:ext>
+            </a:extLst>
+          </p:cNvPr>
+          <p:cNvSpPr/>
+          <p:nvPr/>
+        </p:nvSpPr>
+        <p:spPr>
+          <a:xfrm>
+            <a:off x="2192694" y="4715069"/>
+            <a:ext cx="1894114" cy="531845"/>
+          </a:xfrm>
+          <a:prstGeom prst="roundRect">
+            <a:avLst/>
+          </a:prstGeom>
+          <a:solidFill>
+            <a:srgbClr val="00B050"/>
+          </a:solidFill>
+          <a:ln>
+            <a:solidFill>
+              <a:schemeClr val="bg1"/>
+            </a:solidFill>
+          </a:ln>
+          <a:effectLst>
+            <a:outerShdw blurRad="50800" dist="38100" dir="2700000" algn="tl" rotWithShape="0">
+              <a:prstClr val="black">
+                <a:alpha val="40000"/>
+              </a:prstClr>
+            </a:outerShdw>
+          </a:effectLst>
+        </p:spPr>
+        <p:style>
+          <a:lnRef idx="2">
+            <a:schemeClr val="accent1">
+              <a:shade val="50000"/>
+            </a:schemeClr>
+          </a:lnRef>
+          <a:fillRef idx="1">
+            <a:schemeClr val="accent1"/>
+          </a:fillRef>
+          <a:effectRef idx="0">
+            <a:schemeClr val="accent1"/>
+          </a:effectRef>
+          <a:fontRef idx="minor">
+            <a:schemeClr val="lt1"/>
+          </a:fontRef>
+        </p:style>
+        <p:txBody>
+          <a:bodyPr rtlCol="0" anchor="ctr"/>
+          <a:lstStyle/>
+          <a:p>
+            <a:pPr algn="ctr"/>
+            <a:r>
+              <a:rPr lang="en-GB" sz="1400" b="1" dirty="0">
+                <a:latin typeface="Articulate" panose="02000503040000020004" pitchFamily="2" charset="0"/>
+              </a:rPr>
+              <a:t>PLAY GAME</a:t>
+            </a:r>
+          </a:p>
+        </p:txBody>
+      </p:sp>
     </p:spTree>
+    <p:custDataLst>
+      <p:tags r:id="rId1"/>
+    </p:custDataLst>
     <p:extLst>
       <p:ext uri="{BB962C8B-B14F-4D97-AF65-F5344CB8AC3E}">
         <p14:creationId xmlns:p14="http://schemas.microsoft.com/office/powerpoint/2010/main" val="1860401258"/>
@@ -4279,6 +4356,19 @@
     <a:masterClrMapping/>
   </p:clrMapOvr>
 </p:sld>
+</file>
+
+<file path=ppt/tags/tag1.xml><?xml version="1.0" encoding="utf-8"?>
+<p:tagLst xmlns:a="http://schemas.openxmlformats.org/drawingml/2006/main" xmlns:r="http://schemas.openxmlformats.org/officeDocument/2006/relationships" xmlns:p="http://schemas.openxmlformats.org/presentationml/2006/main">
+  <p:tag name="ARTICULATE_PROJECT_OPEN" val="0"/>
+  <p:tag name="ARTICULATE_SLIDE_COUNT" val="1"/>
+</p:tagLst>
+</file>
+
+<file path=ppt/tags/tag2.xml><?xml version="1.0" encoding="utf-8"?>
+<p:tagLst xmlns:a="http://schemas.openxmlformats.org/drawingml/2006/main" xmlns:r="http://schemas.openxmlformats.org/officeDocument/2006/relationships" xmlns:p="http://schemas.openxmlformats.org/presentationml/2006/main">
+  <p:tag name="ARTICULATE_SLIDE_THUMBNAIL_REFRESH" val="1"/>
+</p:tagLst>
 </file>
 
 <file path=ppt/theme/theme1.xml><?xml version="1.0" encoding="utf-8"?>

</xml_diff>

<commit_message>
Added scoreboard functionality with reset
</commit_message>
<xml_diff>
--- a/working-files/Visual Assets.pptx
+++ b/working-files/Visual Assets.pptx
@@ -264,7 +264,7 @@
           <a:p>
             <a:fld id="{6E6BD9C6-B86F-4CFE-B11B-D2762FE2A89F}" type="datetimeFigureOut">
               <a:rPr lang="en-GB" smtClean="0"/>
-              <a:t>18/09/2022</a:t>
+              <a:t>21/09/2022</a:t>
             </a:fld>
             <a:endParaRPr lang="en-GB"/>
           </a:p>
@@ -464,7 +464,7 @@
           <a:p>
             <a:fld id="{6E6BD9C6-B86F-4CFE-B11B-D2762FE2A89F}" type="datetimeFigureOut">
               <a:rPr lang="en-GB" smtClean="0"/>
-              <a:t>18/09/2022</a:t>
+              <a:t>21/09/2022</a:t>
             </a:fld>
             <a:endParaRPr lang="en-GB"/>
           </a:p>
@@ -674,7 +674,7 @@
           <a:p>
             <a:fld id="{6E6BD9C6-B86F-4CFE-B11B-D2762FE2A89F}" type="datetimeFigureOut">
               <a:rPr lang="en-GB" smtClean="0"/>
-              <a:t>18/09/2022</a:t>
+              <a:t>21/09/2022</a:t>
             </a:fld>
             <a:endParaRPr lang="en-GB"/>
           </a:p>
@@ -874,7 +874,7 @@
           <a:p>
             <a:fld id="{6E6BD9C6-B86F-4CFE-B11B-D2762FE2A89F}" type="datetimeFigureOut">
               <a:rPr lang="en-GB" smtClean="0"/>
-              <a:t>18/09/2022</a:t>
+              <a:t>21/09/2022</a:t>
             </a:fld>
             <a:endParaRPr lang="en-GB"/>
           </a:p>
@@ -1150,7 +1150,7 @@
           <a:p>
             <a:fld id="{6E6BD9C6-B86F-4CFE-B11B-D2762FE2A89F}" type="datetimeFigureOut">
               <a:rPr lang="en-GB" smtClean="0"/>
-              <a:t>18/09/2022</a:t>
+              <a:t>21/09/2022</a:t>
             </a:fld>
             <a:endParaRPr lang="en-GB"/>
           </a:p>
@@ -1418,7 +1418,7 @@
           <a:p>
             <a:fld id="{6E6BD9C6-B86F-4CFE-B11B-D2762FE2A89F}" type="datetimeFigureOut">
               <a:rPr lang="en-GB" smtClean="0"/>
-              <a:t>18/09/2022</a:t>
+              <a:t>21/09/2022</a:t>
             </a:fld>
             <a:endParaRPr lang="en-GB"/>
           </a:p>
@@ -1833,7 +1833,7 @@
           <a:p>
             <a:fld id="{6E6BD9C6-B86F-4CFE-B11B-D2762FE2A89F}" type="datetimeFigureOut">
               <a:rPr lang="en-GB" smtClean="0"/>
-              <a:t>18/09/2022</a:t>
+              <a:t>21/09/2022</a:t>
             </a:fld>
             <a:endParaRPr lang="en-GB"/>
           </a:p>
@@ -1975,7 +1975,7 @@
           <a:p>
             <a:fld id="{6E6BD9C6-B86F-4CFE-B11B-D2762FE2A89F}" type="datetimeFigureOut">
               <a:rPr lang="en-GB" smtClean="0"/>
-              <a:t>18/09/2022</a:t>
+              <a:t>21/09/2022</a:t>
             </a:fld>
             <a:endParaRPr lang="en-GB"/>
           </a:p>
@@ -2088,7 +2088,7 @@
           <a:p>
             <a:fld id="{6E6BD9C6-B86F-4CFE-B11B-D2762FE2A89F}" type="datetimeFigureOut">
               <a:rPr lang="en-GB" smtClean="0"/>
-              <a:t>18/09/2022</a:t>
+              <a:t>21/09/2022</a:t>
             </a:fld>
             <a:endParaRPr lang="en-GB"/>
           </a:p>
@@ -2401,7 +2401,7 @@
           <a:p>
             <a:fld id="{6E6BD9C6-B86F-4CFE-B11B-D2762FE2A89F}" type="datetimeFigureOut">
               <a:rPr lang="en-GB" smtClean="0"/>
-              <a:t>18/09/2022</a:t>
+              <a:t>21/09/2022</a:t>
             </a:fld>
             <a:endParaRPr lang="en-GB"/>
           </a:p>
@@ -2690,7 +2690,7 @@
           <a:p>
             <a:fld id="{6E6BD9C6-B86F-4CFE-B11B-D2762FE2A89F}" type="datetimeFigureOut">
               <a:rPr lang="en-GB" smtClean="0"/>
-              <a:t>18/09/2022</a:t>
+              <a:t>21/09/2022</a:t>
             </a:fld>
             <a:endParaRPr lang="en-GB"/>
           </a:p>
@@ -2933,7 +2933,7 @@
           <a:p>
             <a:fld id="{6E6BD9C6-B86F-4CFE-B11B-D2762FE2A89F}" type="datetimeFigureOut">
               <a:rPr lang="en-GB" smtClean="0"/>
-              <a:t>18/09/2022</a:t>
+              <a:t>21/09/2022</a:t>
             </a:fld>
             <a:endParaRPr lang="en-GB"/>
           </a:p>
@@ -4342,6 +4342,72 @@
           </a:p>
         </p:txBody>
       </p:sp>
+      <p:sp>
+        <p:nvSpPr>
+          <p:cNvPr id="3" name="Rectangle: Rounded Corners 2">
+            <a:extLst>
+              <a:ext uri="{FF2B5EF4-FFF2-40B4-BE49-F238E27FC236}">
+                <a16:creationId xmlns:a16="http://schemas.microsoft.com/office/drawing/2014/main" id="{5553ABAA-E210-6A89-9086-BF85FAEF8B56}"/>
+              </a:ext>
+            </a:extLst>
+          </p:cNvPr>
+          <p:cNvSpPr/>
+          <p:nvPr/>
+        </p:nvSpPr>
+        <p:spPr>
+          <a:xfrm>
+            <a:off x="2192694" y="5460896"/>
+            <a:ext cx="1894114" cy="531845"/>
+          </a:xfrm>
+          <a:prstGeom prst="roundRect">
+            <a:avLst/>
+          </a:prstGeom>
+          <a:solidFill>
+            <a:srgbClr val="00B050"/>
+          </a:solidFill>
+          <a:ln>
+            <a:solidFill>
+              <a:schemeClr val="bg1"/>
+            </a:solidFill>
+          </a:ln>
+          <a:effectLst>
+            <a:outerShdw blurRad="50800" dist="38100" dir="2700000" algn="tl" rotWithShape="0">
+              <a:prstClr val="black">
+                <a:alpha val="40000"/>
+              </a:prstClr>
+            </a:outerShdw>
+          </a:effectLst>
+        </p:spPr>
+        <p:style>
+          <a:lnRef idx="2">
+            <a:schemeClr val="accent1">
+              <a:shade val="50000"/>
+            </a:schemeClr>
+          </a:lnRef>
+          <a:fillRef idx="1">
+            <a:schemeClr val="accent1"/>
+          </a:fillRef>
+          <a:effectRef idx="0">
+            <a:schemeClr val="accent1"/>
+          </a:effectRef>
+          <a:fontRef idx="minor">
+            <a:schemeClr val="lt1"/>
+          </a:fontRef>
+        </p:style>
+        <p:txBody>
+          <a:bodyPr rtlCol="0" anchor="ctr"/>
+          <a:lstStyle/>
+          <a:p>
+            <a:pPr algn="ctr"/>
+            <a:r>
+              <a:rPr lang="en-GB" sz="1400" b="1" dirty="0">
+                <a:latin typeface="Articulate" panose="02000503040000020004" pitchFamily="2" charset="0"/>
+              </a:rPr>
+              <a:t>PLAY AGAIN</a:t>
+            </a:r>
+          </a:p>
+        </p:txBody>
+      </p:sp>
     </p:spTree>
     <p:custDataLst>
       <p:tags r:id="rId1"/>
@@ -4360,8 +4426,8 @@
 
 <file path=ppt/tags/tag1.xml><?xml version="1.0" encoding="utf-8"?>
 <p:tagLst xmlns:a="http://schemas.openxmlformats.org/drawingml/2006/main" xmlns:r="http://schemas.openxmlformats.org/officeDocument/2006/relationships" xmlns:p="http://schemas.openxmlformats.org/presentationml/2006/main">
+  <p:tag name="ARTICULATE_SLIDE_COUNT" val="1"/>
   <p:tag name="ARTICULATE_PROJECT_OPEN" val="0"/>
-  <p:tag name="ARTICULATE_SLIDE_COUNT" val="1"/>
 </p:tagLst>
 </file>
 

</xml_diff>